<commit_message>
new server that saves things
</commit_message>
<xml_diff>
--- a/week08/week08.pptx
+++ b/week08/week08.pptx
@@ -220,7 +220,7 @@
             <a:fld id="{A97C8422-C8B8-4BC4-B711-60DC022E0201}" type="datetimeFigureOut">
               <a:rPr lang="en-US" smtClean="0"/>
               <a:pPr/>
-              <a:t>10/15/14</a:t>
+              <a:t>10/16/14</a:t>
             </a:fld>
             <a:endParaRPr lang="en-US"/>
           </a:p>
@@ -1782,7 +1782,7 @@
             <a:fld id="{6534EC56-5BE0-CF40-A0E9-9B07941CA105}" type="datetimeFigureOut">
               <a:rPr lang="en-US" smtClean="0"/>
               <a:pPr/>
-              <a:t>10/15/14</a:t>
+              <a:t>10/16/14</a:t>
             </a:fld>
             <a:endParaRPr lang="en-US"/>
           </a:p>
@@ -2116,7 +2116,7 @@
             <a:fld id="{6534EC56-5BE0-CF40-A0E9-9B07941CA105}" type="datetimeFigureOut">
               <a:rPr lang="en-US" smtClean="0"/>
               <a:pPr/>
-              <a:t>10/15/14</a:t>
+              <a:t>10/16/14</a:t>
             </a:fld>
             <a:endParaRPr lang="en-US"/>
           </a:p>
@@ -2450,7 +2450,7 @@
             <a:fld id="{6534EC56-5BE0-CF40-A0E9-9B07941CA105}" type="datetimeFigureOut">
               <a:rPr lang="en-US" smtClean="0"/>
               <a:pPr/>
-              <a:t>10/15/14</a:t>
+              <a:t>10/16/14</a:t>
             </a:fld>
             <a:endParaRPr lang="en-US"/>
           </a:p>
@@ -2784,7 +2784,7 @@
             <a:fld id="{6534EC56-5BE0-CF40-A0E9-9B07941CA105}" type="datetimeFigureOut">
               <a:rPr lang="en-US" smtClean="0"/>
               <a:pPr/>
-              <a:t>10/15/14</a:t>
+              <a:t>10/16/14</a:t>
             </a:fld>
             <a:endParaRPr lang="en-US"/>
           </a:p>
@@ -3475,7 +3475,7 @@
             <a:fld id="{6534EC56-5BE0-CF40-A0E9-9B07941CA105}" type="datetimeFigureOut">
               <a:rPr lang="en-US" smtClean="0"/>
               <a:pPr/>
-              <a:t>10/15/14</a:t>
+              <a:t>10/16/14</a:t>
             </a:fld>
             <a:endParaRPr lang="en-US"/>
           </a:p>
@@ -3656,7 +3656,7 @@
             <a:fld id="{6534EC56-5BE0-CF40-A0E9-9B07941CA105}" type="datetimeFigureOut">
               <a:rPr lang="en-US" smtClean="0"/>
               <a:pPr/>
-              <a:t>10/15/14</a:t>
+              <a:t>10/16/14</a:t>
             </a:fld>
             <a:endParaRPr lang="en-US"/>
           </a:p>
@@ -3832,7 +3832,7 @@
             <a:fld id="{6534EC56-5BE0-CF40-A0E9-9B07941CA105}" type="datetimeFigureOut">
               <a:rPr lang="en-US" smtClean="0"/>
               <a:pPr/>
-              <a:t>10/15/14</a:t>
+              <a:t>10/16/14</a:t>
             </a:fld>
             <a:endParaRPr lang="en-US"/>
           </a:p>
@@ -4082,7 +4082,7 @@
             <a:fld id="{6534EC56-5BE0-CF40-A0E9-9B07941CA105}" type="datetimeFigureOut">
               <a:rPr lang="en-US" smtClean="0"/>
               <a:pPr/>
-              <a:t>10/15/14</a:t>
+              <a:t>10/16/14</a:t>
             </a:fld>
             <a:endParaRPr lang="en-US"/>
           </a:p>
@@ -4414,7 +4414,7 @@
             <a:fld id="{6534EC56-5BE0-CF40-A0E9-9B07941CA105}" type="datetimeFigureOut">
               <a:rPr lang="en-US" smtClean="0"/>
               <a:pPr/>
-              <a:t>10/15/14</a:t>
+              <a:t>10/16/14</a:t>
             </a:fld>
             <a:endParaRPr lang="en-US"/>
           </a:p>
@@ -4708,7 +4708,7 @@
             <a:fld id="{6534EC56-5BE0-CF40-A0E9-9B07941CA105}" type="datetimeFigureOut">
               <a:rPr lang="en-US" smtClean="0"/>
               <a:pPr/>
-              <a:t>10/15/14</a:t>
+              <a:t>10/16/14</a:t>
             </a:fld>
             <a:endParaRPr lang="en-US"/>
           </a:p>
@@ -5146,7 +5146,7 @@
             <a:fld id="{6534EC56-5BE0-CF40-A0E9-9B07941CA105}" type="datetimeFigureOut">
               <a:rPr lang="en-US" smtClean="0"/>
               <a:pPr/>
-              <a:t>10/15/14</a:t>
+              <a:t>10/16/14</a:t>
             </a:fld>
             <a:endParaRPr lang="en-US"/>
           </a:p>
@@ -5335,7 +5335,7 @@
             <a:fld id="{6534EC56-5BE0-CF40-A0E9-9B07941CA105}" type="datetimeFigureOut">
               <a:rPr lang="en-US" smtClean="0"/>
               <a:pPr/>
-              <a:t>10/15/14</a:t>
+              <a:t>10/16/14</a:t>
             </a:fld>
             <a:endParaRPr lang="en-US"/>
           </a:p>
@@ -5427,7 +5427,7 @@
             <a:fld id="{6534EC56-5BE0-CF40-A0E9-9B07941CA105}" type="datetimeFigureOut">
               <a:rPr lang="en-US" smtClean="0"/>
               <a:pPr/>
-              <a:t>10/15/14</a:t>
+              <a:t>10/16/14</a:t>
             </a:fld>
             <a:endParaRPr lang="en-US"/>
           </a:p>
@@ -5710,7 +5710,7 @@
             <a:fld id="{6534EC56-5BE0-CF40-A0E9-9B07941CA105}" type="datetimeFigureOut">
               <a:rPr lang="en-US" smtClean="0"/>
               <a:pPr/>
-              <a:t>10/15/14</a:t>
+              <a:t>10/16/14</a:t>
             </a:fld>
             <a:endParaRPr lang="en-US"/>
           </a:p>
@@ -5933,7 +5933,7 @@
             <a:fld id="{6534EC56-5BE0-CF40-A0E9-9B07941CA105}" type="datetimeFigureOut">
               <a:rPr lang="en-US" smtClean="0"/>
               <a:pPr/>
-              <a:t>10/15/14</a:t>
+              <a:t>10/16/14</a:t>
             </a:fld>
             <a:endParaRPr lang="en-US"/>
           </a:p>
@@ -6770,13 +6770,8 @@
             </a:r>
             <a:r>
               <a:rPr lang="en-US" sz="2400" dirty="0" smtClean="0"/>
-              <a:t>called, response headers have been </a:t>
-            </a:r>
-            <a:r>
-              <a:rPr lang="en-US" sz="2400" dirty="0" smtClean="0"/>
-              <a:t>received</a:t>
-            </a:r>
-            <a:endParaRPr lang="en-US" sz="2400" dirty="0" smtClean="0"/>
+              <a:t>called, response headers have been received</a:t>
+            </a:r>
           </a:p>
           <a:p>
             <a:pPr lvl="1"/>
@@ -7387,13 +7382,8 @@
             </a:r>
             <a:r>
               <a:rPr lang="en-US" sz="1550" dirty="0" smtClean="0"/>
-              <a:t>called, response headers have been </a:t>
-            </a:r>
-            <a:r>
-              <a:rPr lang="en-US" sz="1550" dirty="0" smtClean="0"/>
-              <a:t>received</a:t>
-            </a:r>
-            <a:endParaRPr lang="en-US" sz="1550" dirty="0" smtClean="0"/>
+              <a:t>called, response headers have been received</a:t>
+            </a:r>
           </a:p>
           <a:p>
             <a:pPr lvl="1"/>
@@ -8346,6 +8336,13 @@
   <p:clrMapOvr>
     <a:masterClrMapping/>
   </p:clrMapOvr>
+  <p:timing>
+    <p:tnLst>
+      <p:par>
+        <p:cTn xmlns:p14="http://schemas.microsoft.com/office/powerpoint/2010/main" id="1" dur="indefinite" restart="never" nodeType="tmRoot"/>
+      </p:par>
+    </p:tnLst>
+  </p:timing>
 </p:sld>
 </file>
 
@@ -9089,7 +9086,7 @@
                 <a:latin typeface="Courier New"/>
                 <a:cs typeface="Courier New"/>
               </a:rPr>
-              <a:t>”http</a:t>
+              <a:t>"http</a:t>
             </a:r>
             <a:r>
               <a:rPr lang="en-US" dirty="0">
@@ -9616,7 +9613,7 @@
                 <a:latin typeface="Courier New"/>
                 <a:cs typeface="Courier New"/>
               </a:rPr>
-              <a:t>”http</a:t>
+              <a:t>"http</a:t>
             </a:r>
             <a:r>
               <a:rPr lang="en-US" dirty="0">
@@ -10149,7 +10146,7 @@
                 <a:latin typeface="Courier New"/>
                 <a:cs typeface="Courier New"/>
               </a:rPr>
-              <a:t>”http</a:t>
+              <a:t>"http</a:t>
             </a:r>
             <a:r>
               <a:rPr lang="en-US" dirty="0">
@@ -10418,6 +10415,13 @@
   <p:clrMapOvr>
     <a:masterClrMapping/>
   </p:clrMapOvr>
+  <p:timing>
+    <p:tnLst>
+      <p:par>
+        <p:cTn xmlns:p14="http://schemas.microsoft.com/office/powerpoint/2010/main" id="1" dur="indefinite" restart="never" nodeType="tmRoot"/>
+      </p:par>
+    </p:tnLst>
+  </p:timing>
 </p:sld>
 </file>
 
@@ -10804,7 +10808,7 @@
                 <a:latin typeface="Courier New"/>
                 <a:cs typeface="Courier New"/>
               </a:rPr>
-              <a:t>”http</a:t>
+              <a:t>"http</a:t>
             </a:r>
             <a:r>
               <a:rPr lang="en-US" dirty="0">
@@ -11298,7 +11302,7 @@
                 <a:latin typeface="Courier New"/>
                 <a:cs typeface="Courier New"/>
               </a:rPr>
-              <a:t>”http</a:t>
+              <a:t>"http</a:t>
             </a:r>
             <a:r>
               <a:rPr lang="en-US" dirty="0">
@@ -11984,7 +11988,7 @@
                 <a:latin typeface="Courier New"/>
                 <a:cs typeface="Courier New"/>
               </a:rPr>
-              <a:t>”http</a:t>
+              <a:t>"http</a:t>
             </a:r>
             <a:r>
               <a:rPr lang="en-US" dirty="0">
@@ -13551,6 +13555,13 @@
   <p:clrMapOvr>
     <a:masterClrMapping/>
   </p:clrMapOvr>
+  <p:timing>
+    <p:tnLst>
+      <p:par>
+        <p:cTn xmlns:p14="http://schemas.microsoft.com/office/powerpoint/2010/main" id="1" dur="indefinite" restart="never" nodeType="tmRoot"/>
+      </p:par>
+    </p:tnLst>
+  </p:timing>
 </p:sld>
 </file>
 
@@ -13652,6 +13663,13 @@
   <p:clrMapOvr>
     <a:masterClrMapping/>
   </p:clrMapOvr>
+  <p:timing>
+    <p:tnLst>
+      <p:par>
+        <p:cTn xmlns:p14="http://schemas.microsoft.com/office/powerpoint/2010/main" id="1" dur="indefinite" restart="never" nodeType="tmRoot"/>
+      </p:par>
+    </p:tnLst>
+  </p:timing>
 </p:sld>
 </file>
 

</xml_diff>

<commit_message>
get weeks 8 and 10 ready
</commit_message>
<xml_diff>
--- a/week08/week08.pptx
+++ b/week08/week08.pptx
@@ -220,7 +220,7 @@
             <a:fld id="{A97C8422-C8B8-4BC4-B711-60DC022E0201}" type="datetimeFigureOut">
               <a:rPr lang="en-US" smtClean="0"/>
               <a:pPr/>
-              <a:t>10/16/14</a:t>
+              <a:t>10/21/14</a:t>
             </a:fld>
             <a:endParaRPr lang="en-US"/>
           </a:p>
@@ -1782,7 +1782,7 @@
             <a:fld id="{6534EC56-5BE0-CF40-A0E9-9B07941CA105}" type="datetimeFigureOut">
               <a:rPr lang="en-US" smtClean="0"/>
               <a:pPr/>
-              <a:t>10/16/14</a:t>
+              <a:t>10/21/14</a:t>
             </a:fld>
             <a:endParaRPr lang="en-US"/>
           </a:p>
@@ -2116,7 +2116,7 @@
             <a:fld id="{6534EC56-5BE0-CF40-A0E9-9B07941CA105}" type="datetimeFigureOut">
               <a:rPr lang="en-US" smtClean="0"/>
               <a:pPr/>
-              <a:t>10/16/14</a:t>
+              <a:t>10/21/14</a:t>
             </a:fld>
             <a:endParaRPr lang="en-US"/>
           </a:p>
@@ -2450,7 +2450,7 @@
             <a:fld id="{6534EC56-5BE0-CF40-A0E9-9B07941CA105}" type="datetimeFigureOut">
               <a:rPr lang="en-US" smtClean="0"/>
               <a:pPr/>
-              <a:t>10/16/14</a:t>
+              <a:t>10/21/14</a:t>
             </a:fld>
             <a:endParaRPr lang="en-US"/>
           </a:p>
@@ -2784,7 +2784,7 @@
             <a:fld id="{6534EC56-5BE0-CF40-A0E9-9B07941CA105}" type="datetimeFigureOut">
               <a:rPr lang="en-US" smtClean="0"/>
               <a:pPr/>
-              <a:t>10/16/14</a:t>
+              <a:t>10/21/14</a:t>
             </a:fld>
             <a:endParaRPr lang="en-US"/>
           </a:p>
@@ -3475,7 +3475,7 @@
             <a:fld id="{6534EC56-5BE0-CF40-A0E9-9B07941CA105}" type="datetimeFigureOut">
               <a:rPr lang="en-US" smtClean="0"/>
               <a:pPr/>
-              <a:t>10/16/14</a:t>
+              <a:t>10/21/14</a:t>
             </a:fld>
             <a:endParaRPr lang="en-US"/>
           </a:p>
@@ -3656,7 +3656,7 @@
             <a:fld id="{6534EC56-5BE0-CF40-A0E9-9B07941CA105}" type="datetimeFigureOut">
               <a:rPr lang="en-US" smtClean="0"/>
               <a:pPr/>
-              <a:t>10/16/14</a:t>
+              <a:t>10/21/14</a:t>
             </a:fld>
             <a:endParaRPr lang="en-US"/>
           </a:p>
@@ -3832,7 +3832,7 @@
             <a:fld id="{6534EC56-5BE0-CF40-A0E9-9B07941CA105}" type="datetimeFigureOut">
               <a:rPr lang="en-US" smtClean="0"/>
               <a:pPr/>
-              <a:t>10/16/14</a:t>
+              <a:t>10/21/14</a:t>
             </a:fld>
             <a:endParaRPr lang="en-US"/>
           </a:p>
@@ -4082,7 +4082,7 @@
             <a:fld id="{6534EC56-5BE0-CF40-A0E9-9B07941CA105}" type="datetimeFigureOut">
               <a:rPr lang="en-US" smtClean="0"/>
               <a:pPr/>
-              <a:t>10/16/14</a:t>
+              <a:t>10/21/14</a:t>
             </a:fld>
             <a:endParaRPr lang="en-US"/>
           </a:p>
@@ -4414,7 +4414,7 @@
             <a:fld id="{6534EC56-5BE0-CF40-A0E9-9B07941CA105}" type="datetimeFigureOut">
               <a:rPr lang="en-US" smtClean="0"/>
               <a:pPr/>
-              <a:t>10/16/14</a:t>
+              <a:t>10/21/14</a:t>
             </a:fld>
             <a:endParaRPr lang="en-US"/>
           </a:p>
@@ -4708,7 +4708,7 @@
             <a:fld id="{6534EC56-5BE0-CF40-A0E9-9B07941CA105}" type="datetimeFigureOut">
               <a:rPr lang="en-US" smtClean="0"/>
               <a:pPr/>
-              <a:t>10/16/14</a:t>
+              <a:t>10/21/14</a:t>
             </a:fld>
             <a:endParaRPr lang="en-US"/>
           </a:p>
@@ -5146,7 +5146,7 @@
             <a:fld id="{6534EC56-5BE0-CF40-A0E9-9B07941CA105}" type="datetimeFigureOut">
               <a:rPr lang="en-US" smtClean="0"/>
               <a:pPr/>
-              <a:t>10/16/14</a:t>
+              <a:t>10/21/14</a:t>
             </a:fld>
             <a:endParaRPr lang="en-US"/>
           </a:p>
@@ -5335,7 +5335,7 @@
             <a:fld id="{6534EC56-5BE0-CF40-A0E9-9B07941CA105}" type="datetimeFigureOut">
               <a:rPr lang="en-US" smtClean="0"/>
               <a:pPr/>
-              <a:t>10/16/14</a:t>
+              <a:t>10/21/14</a:t>
             </a:fld>
             <a:endParaRPr lang="en-US"/>
           </a:p>
@@ -5427,7 +5427,7 @@
             <a:fld id="{6534EC56-5BE0-CF40-A0E9-9B07941CA105}" type="datetimeFigureOut">
               <a:rPr lang="en-US" smtClean="0"/>
               <a:pPr/>
-              <a:t>10/16/14</a:t>
+              <a:t>10/21/14</a:t>
             </a:fld>
             <a:endParaRPr lang="en-US"/>
           </a:p>
@@ -5710,7 +5710,7 @@
             <a:fld id="{6534EC56-5BE0-CF40-A0E9-9B07941CA105}" type="datetimeFigureOut">
               <a:rPr lang="en-US" smtClean="0"/>
               <a:pPr/>
-              <a:t>10/16/14</a:t>
+              <a:t>10/21/14</a:t>
             </a:fld>
             <a:endParaRPr lang="en-US"/>
           </a:p>
@@ -5933,7 +5933,7 @@
             <a:fld id="{6534EC56-5BE0-CF40-A0E9-9B07941CA105}" type="datetimeFigureOut">
               <a:rPr lang="en-US" smtClean="0"/>
               <a:pPr/>
-              <a:t>10/16/14</a:t>
+              <a:t>10/21/14</a:t>
             </a:fld>
             <a:endParaRPr lang="en-US"/>
           </a:p>
@@ -8371,7 +8371,7 @@
         </p:nvSpPr>
         <p:spPr>
           <a:xfrm>
-            <a:off x="547945" y="2046246"/>
+            <a:off x="547945" y="2069337"/>
             <a:ext cx="8852227" cy="3139321"/>
           </a:xfrm>
           <a:prstGeom prst="rect">

</xml_diff>